<commit_message>
Finished notes to NOSQL_Basic
</commit_message>
<xml_diff>
--- a/ppt/NOSQL_Basic_Knowledge/01.pptx
+++ b/ppt/NOSQL_Basic_Knowledge/01.pptx
@@ -4,6 +4,14 @@
   <p:sldMasterIdLst>
     <p:sldMasterId id="2147483648" r:id="rId1"/>
   </p:sldMasterIdLst>
+  <p:sldIdLst>
+    <p:sldId id="256" r:id="rId2"/>
+    <p:sldId id="257" r:id="rId3"/>
+    <p:sldId id="258" r:id="rId4"/>
+    <p:sldId id="261" r:id="rId5"/>
+    <p:sldId id="259" r:id="rId6"/>
+    <p:sldId id="260" r:id="rId7"/>
+  </p:sldIdLst>
   <p:sldSz cx="9144000" cy="6858000" type="screen4x3"/>
   <p:notesSz cx="6858000" cy="9144000"/>
   <p:defaultTextStyle>
@@ -285,7 +293,7 @@
           <a:p>
             <a:fld id="{E90ED720-0104-4369-84BC-D37694168613}" type="datetimeFigureOut">
               <a:rPr kumimoji="1" lang="ja-JP" altLang="en-US" smtClean="0"/>
-              <a:t>2006/9/6</a:t>
+              <a:t>2013/11/1</a:t>
             </a:fld>
             <a:endParaRPr kumimoji="1" lang="ja-JP" altLang="en-US"/>
           </a:p>
@@ -327,7 +335,7 @@
           <a:p>
             <a:fld id="{D2D8002D-B5B0-4BAC-B1F6-782DDCCE6D9C}" type="slidenum">
               <a:rPr kumimoji="1" lang="ja-JP" altLang="en-US" smtClean="0"/>
-              <a:t>&lt;#&gt;</a:t>
+              <a:t>‹#›</a:t>
             </a:fld>
             <a:endParaRPr kumimoji="1" lang="ja-JP" altLang="en-US"/>
           </a:p>
@@ -482,7 +490,7 @@
           <a:p>
             <a:fld id="{E90ED720-0104-4369-84BC-D37694168613}" type="datetimeFigureOut">
               <a:rPr kumimoji="1" lang="ja-JP" altLang="en-US" smtClean="0"/>
-              <a:t>2006/9/6</a:t>
+              <a:t>2013/11/1</a:t>
             </a:fld>
             <a:endParaRPr kumimoji="1" lang="ja-JP" altLang="en-US"/>
           </a:p>
@@ -524,7 +532,7 @@
           <a:p>
             <a:fld id="{D2D8002D-B5B0-4BAC-B1F6-782DDCCE6D9C}" type="slidenum">
               <a:rPr kumimoji="1" lang="ja-JP" altLang="en-US" smtClean="0"/>
-              <a:t>&lt;#&gt;</a:t>
+              <a:t>‹#›</a:t>
             </a:fld>
             <a:endParaRPr kumimoji="1" lang="ja-JP" altLang="en-US"/>
           </a:p>
@@ -689,7 +697,7 @@
           <a:p>
             <a:fld id="{E90ED720-0104-4369-84BC-D37694168613}" type="datetimeFigureOut">
               <a:rPr kumimoji="1" lang="ja-JP" altLang="en-US" smtClean="0"/>
-              <a:t>2006/9/6</a:t>
+              <a:t>2013/11/1</a:t>
             </a:fld>
             <a:endParaRPr kumimoji="1" lang="ja-JP" altLang="en-US"/>
           </a:p>
@@ -731,7 +739,7 @@
           <a:p>
             <a:fld id="{D2D8002D-B5B0-4BAC-B1F6-782DDCCE6D9C}" type="slidenum">
               <a:rPr kumimoji="1" lang="ja-JP" altLang="en-US" smtClean="0"/>
-              <a:t>&lt;#&gt;</a:t>
+              <a:t>‹#›</a:t>
             </a:fld>
             <a:endParaRPr kumimoji="1" lang="ja-JP" altLang="en-US"/>
           </a:p>
@@ -886,7 +894,7 @@
           <a:p>
             <a:fld id="{E90ED720-0104-4369-84BC-D37694168613}" type="datetimeFigureOut">
               <a:rPr kumimoji="1" lang="ja-JP" altLang="en-US" smtClean="0"/>
-              <a:t>2006/9/6</a:t>
+              <a:t>2013/11/1</a:t>
             </a:fld>
             <a:endParaRPr kumimoji="1" lang="ja-JP" altLang="en-US"/>
           </a:p>
@@ -928,7 +936,7 @@
           <a:p>
             <a:fld id="{D2D8002D-B5B0-4BAC-B1F6-782DDCCE6D9C}" type="slidenum">
               <a:rPr kumimoji="1" lang="ja-JP" altLang="en-US" smtClean="0"/>
-              <a:t>&lt;#&gt;</a:t>
+              <a:t>‹#›</a:t>
             </a:fld>
             <a:endParaRPr kumimoji="1" lang="ja-JP" altLang="en-US"/>
           </a:p>
@@ -1127,7 +1135,7 @@
           <a:p>
             <a:fld id="{E90ED720-0104-4369-84BC-D37694168613}" type="datetimeFigureOut">
               <a:rPr kumimoji="1" lang="ja-JP" altLang="en-US" smtClean="0"/>
-              <a:t>2006/9/6</a:t>
+              <a:t>2013/11/1</a:t>
             </a:fld>
             <a:endParaRPr kumimoji="1" lang="ja-JP" altLang="en-US"/>
           </a:p>
@@ -1169,7 +1177,7 @@
           <a:p>
             <a:fld id="{D2D8002D-B5B0-4BAC-B1F6-782DDCCE6D9C}" type="slidenum">
               <a:rPr kumimoji="1" lang="ja-JP" altLang="en-US" smtClean="0"/>
-              <a:t>&lt;#&gt;</a:t>
+              <a:t>‹#›</a:t>
             </a:fld>
             <a:endParaRPr kumimoji="1" lang="ja-JP" altLang="en-US"/>
           </a:p>
@@ -1474,7 +1482,7 @@
           <a:p>
             <a:fld id="{E90ED720-0104-4369-84BC-D37694168613}" type="datetimeFigureOut">
               <a:rPr kumimoji="1" lang="ja-JP" altLang="en-US" smtClean="0"/>
-              <a:t>2006/9/6</a:t>
+              <a:t>2013/11/1</a:t>
             </a:fld>
             <a:endParaRPr kumimoji="1" lang="ja-JP" altLang="en-US"/>
           </a:p>
@@ -1516,7 +1524,7 @@
           <a:p>
             <a:fld id="{D2D8002D-B5B0-4BAC-B1F6-782DDCCE6D9C}" type="slidenum">
               <a:rPr kumimoji="1" lang="ja-JP" altLang="en-US" smtClean="0"/>
-              <a:t>&lt;#&gt;</a:t>
+              <a:t>‹#›</a:t>
             </a:fld>
             <a:endParaRPr kumimoji="1" lang="ja-JP" altLang="en-US"/>
           </a:p>
@@ -1955,7 +1963,7 @@
           <a:p>
             <a:fld id="{E90ED720-0104-4369-84BC-D37694168613}" type="datetimeFigureOut">
               <a:rPr kumimoji="1" lang="ja-JP" altLang="en-US" smtClean="0"/>
-              <a:t>2006/9/6</a:t>
+              <a:t>2013/11/1</a:t>
             </a:fld>
             <a:endParaRPr kumimoji="1" lang="ja-JP" altLang="en-US"/>
           </a:p>
@@ -1997,7 +2005,7 @@
           <a:p>
             <a:fld id="{D2D8002D-B5B0-4BAC-B1F6-782DDCCE6D9C}" type="slidenum">
               <a:rPr kumimoji="1" lang="ja-JP" altLang="en-US" smtClean="0"/>
-              <a:t>&lt;#&gt;</a:t>
+              <a:t>‹#›</a:t>
             </a:fld>
             <a:endParaRPr kumimoji="1" lang="ja-JP" altLang="en-US"/>
           </a:p>
@@ -2068,7 +2076,7 @@
           <a:p>
             <a:fld id="{E90ED720-0104-4369-84BC-D37694168613}" type="datetimeFigureOut">
               <a:rPr kumimoji="1" lang="ja-JP" altLang="en-US" smtClean="0"/>
-              <a:t>2006/9/6</a:t>
+              <a:t>2013/11/1</a:t>
             </a:fld>
             <a:endParaRPr kumimoji="1" lang="ja-JP" altLang="en-US"/>
           </a:p>
@@ -2110,7 +2118,7 @@
           <a:p>
             <a:fld id="{D2D8002D-B5B0-4BAC-B1F6-782DDCCE6D9C}" type="slidenum">
               <a:rPr kumimoji="1" lang="ja-JP" altLang="en-US" smtClean="0"/>
-              <a:t>&lt;#&gt;</a:t>
+              <a:t>‹#›</a:t>
             </a:fld>
             <a:endParaRPr kumimoji="1" lang="ja-JP" altLang="en-US"/>
           </a:p>
@@ -2158,7 +2166,7 @@
           <a:p>
             <a:fld id="{E90ED720-0104-4369-84BC-D37694168613}" type="datetimeFigureOut">
               <a:rPr kumimoji="1" lang="ja-JP" altLang="en-US" smtClean="0"/>
-              <a:t>2006/9/6</a:t>
+              <a:t>2013/11/1</a:t>
             </a:fld>
             <a:endParaRPr kumimoji="1" lang="ja-JP" altLang="en-US"/>
           </a:p>
@@ -2200,7 +2208,7 @@
           <a:p>
             <a:fld id="{D2D8002D-B5B0-4BAC-B1F6-782DDCCE6D9C}" type="slidenum">
               <a:rPr kumimoji="1" lang="ja-JP" altLang="en-US" smtClean="0"/>
-              <a:t>&lt;#&gt;</a:t>
+              <a:t>‹#›</a:t>
             </a:fld>
             <a:endParaRPr kumimoji="1" lang="ja-JP" altLang="en-US"/>
           </a:p>
@@ -2462,7 +2470,7 @@
           <a:p>
             <a:fld id="{E90ED720-0104-4369-84BC-D37694168613}" type="datetimeFigureOut">
               <a:rPr kumimoji="1" lang="ja-JP" altLang="en-US" smtClean="0"/>
-              <a:t>2006/9/6</a:t>
+              <a:t>2013/11/1</a:t>
             </a:fld>
             <a:endParaRPr kumimoji="1" lang="ja-JP" altLang="en-US"/>
           </a:p>
@@ -2504,7 +2512,7 @@
           <a:p>
             <a:fld id="{D2D8002D-B5B0-4BAC-B1F6-782DDCCE6D9C}" type="slidenum">
               <a:rPr kumimoji="1" lang="ja-JP" altLang="en-US" smtClean="0"/>
-              <a:t>&lt;#&gt;</a:t>
+              <a:t>‹#›</a:t>
             </a:fld>
             <a:endParaRPr kumimoji="1" lang="ja-JP" altLang="en-US"/>
           </a:p>
@@ -2710,7 +2718,7 @@
           <a:p>
             <a:fld id="{E90ED720-0104-4369-84BC-D37694168613}" type="datetimeFigureOut">
               <a:rPr kumimoji="1" lang="ja-JP" altLang="en-US" smtClean="0"/>
-              <a:t>2006/9/6</a:t>
+              <a:t>2013/11/1</a:t>
             </a:fld>
             <a:endParaRPr kumimoji="1" lang="ja-JP" altLang="en-US"/>
           </a:p>
@@ -2752,7 +2760,7 @@
           <a:p>
             <a:fld id="{D2D8002D-B5B0-4BAC-B1F6-782DDCCE6D9C}" type="slidenum">
               <a:rPr kumimoji="1" lang="ja-JP" altLang="en-US" smtClean="0"/>
-              <a:t>&lt;#&gt;</a:t>
+              <a:t>‹#›</a:t>
             </a:fld>
             <a:endParaRPr kumimoji="1" lang="ja-JP" altLang="en-US"/>
           </a:p>
@@ -2950,7 +2958,7 @@
           <a:p>
             <a:fld id="{E90ED720-0104-4369-84BC-D37694168613}" type="datetimeFigureOut">
               <a:rPr kumimoji="1" lang="ja-JP" altLang="en-US" smtClean="0"/>
-              <a:t>2006/9/6</a:t>
+              <a:t>2013/11/1</a:t>
             </a:fld>
             <a:endParaRPr kumimoji="1" lang="ja-JP" altLang="en-US"/>
           </a:p>
@@ -3028,7 +3036,7 @@
           <a:p>
             <a:fld id="{D2D8002D-B5B0-4BAC-B1F6-782DDCCE6D9C}" type="slidenum">
               <a:rPr kumimoji="1" lang="ja-JP" altLang="en-US" smtClean="0"/>
-              <a:t>&lt;#&gt;</a:t>
+              <a:t>‹#›</a:t>
             </a:fld>
             <a:endParaRPr kumimoji="1" lang="ja-JP" altLang="en-US"/>
           </a:p>
@@ -3301,6 +3309,852 @@
     </p:otherStyle>
   </p:txStyles>
 </p:sldMaster>
+</file>
+
+<file path=ppt/slides/slide1.xml><?xml version="1.0" encoding="utf-8"?>
+<p:sld xmlns:a="http://schemas.openxmlformats.org/drawingml/2006/main" xmlns:r="http://schemas.openxmlformats.org/officeDocument/2006/relationships" xmlns:p="http://schemas.openxmlformats.org/presentationml/2006/main">
+  <p:cSld>
+    <p:spTree>
+      <p:nvGrpSpPr>
+        <p:cNvPr id="1" name=""/>
+        <p:cNvGrpSpPr/>
+        <p:nvPr/>
+      </p:nvGrpSpPr>
+      <p:grpSpPr>
+        <a:xfrm>
+          <a:off x="0" y="0"/>
+          <a:ext cx="0" cy="0"/>
+          <a:chOff x="0" y="0"/>
+          <a:chExt cx="0" cy="0"/>
+        </a:xfrm>
+      </p:grpSpPr>
+      <p:sp>
+        <p:nvSpPr>
+          <p:cNvPr id="2" name="タイトル 1"/>
+          <p:cNvSpPr>
+            <a:spLocks noGrp="1"/>
+          </p:cNvSpPr>
+          <p:nvPr>
+            <p:ph type="ctrTitle"/>
+          </p:nvPr>
+        </p:nvSpPr>
+        <p:spPr/>
+        <p:txBody>
+          <a:bodyPr/>
+          <a:lstStyle/>
+          <a:p>
+            <a:r>
+              <a:rPr kumimoji="1" lang="en-US" altLang="ja-JP" dirty="0" smtClean="0"/>
+              <a:t>01. NOSQL </a:t>
+            </a:r>
+            <a:r>
+              <a:rPr kumimoji="1" lang="ja-JP" altLang="en-US" dirty="0" smtClean="0"/>
+              <a:t>とは何か？</a:t>
+            </a:r>
+            <a:endParaRPr kumimoji="1" lang="ja-JP" altLang="en-US" dirty="0"/>
+          </a:p>
+        </p:txBody>
+      </p:sp>
+      <p:sp>
+        <p:nvSpPr>
+          <p:cNvPr id="3" name="サブタイトル 2"/>
+          <p:cNvSpPr>
+            <a:spLocks noGrp="1"/>
+          </p:cNvSpPr>
+          <p:nvPr>
+            <p:ph type="subTitle" idx="1"/>
+          </p:nvPr>
+        </p:nvSpPr>
+        <p:spPr/>
+        <p:txBody>
+          <a:bodyPr/>
+          <a:lstStyle/>
+          <a:p>
+            <a:endParaRPr kumimoji="1" lang="ja-JP" altLang="en-US"/>
+          </a:p>
+        </p:txBody>
+      </p:sp>
+    </p:spTree>
+    <p:extLst>
+      <p:ext uri="{BB962C8B-B14F-4D97-AF65-F5344CB8AC3E}">
+        <p14:creationId xmlns:p14="http://schemas.microsoft.com/office/powerpoint/2010/main" val="2347538180"/>
+      </p:ext>
+    </p:extLst>
+  </p:cSld>
+  <p:clrMapOvr>
+    <a:masterClrMapping/>
+  </p:clrMapOvr>
+</p:sld>
+</file>
+
+<file path=ppt/slides/slide2.xml><?xml version="1.0" encoding="utf-8"?>
+<p:sld xmlns:a="http://schemas.openxmlformats.org/drawingml/2006/main" xmlns:r="http://schemas.openxmlformats.org/officeDocument/2006/relationships" xmlns:p="http://schemas.openxmlformats.org/presentationml/2006/main">
+  <p:cSld>
+    <p:spTree>
+      <p:nvGrpSpPr>
+        <p:cNvPr id="1" name=""/>
+        <p:cNvGrpSpPr/>
+        <p:nvPr/>
+      </p:nvGrpSpPr>
+      <p:grpSpPr>
+        <a:xfrm>
+          <a:off x="0" y="0"/>
+          <a:ext cx="0" cy="0"/>
+          <a:chOff x="0" y="0"/>
+          <a:chExt cx="0" cy="0"/>
+        </a:xfrm>
+      </p:grpSpPr>
+      <p:sp>
+        <p:nvSpPr>
+          <p:cNvPr id="2" name="タイトル 1"/>
+          <p:cNvSpPr>
+            <a:spLocks noGrp="1"/>
+          </p:cNvSpPr>
+          <p:nvPr>
+            <p:ph type="title"/>
+          </p:nvPr>
+        </p:nvSpPr>
+        <p:spPr/>
+        <p:txBody>
+          <a:bodyPr/>
+          <a:lstStyle/>
+          <a:p>
+            <a:r>
+              <a:rPr kumimoji="1" lang="ja-JP" altLang="en-US" dirty="0" smtClean="0"/>
+              <a:t>ビッグデータの時代</a:t>
+            </a:r>
+            <a:endParaRPr kumimoji="1" lang="ja-JP" altLang="en-US" dirty="0"/>
+          </a:p>
+        </p:txBody>
+      </p:sp>
+      <p:sp>
+        <p:nvSpPr>
+          <p:cNvPr id="3" name="コンテンツ プレースホルダー 2"/>
+          <p:cNvSpPr>
+            <a:spLocks noGrp="1"/>
+          </p:cNvSpPr>
+          <p:nvPr>
+            <p:ph idx="1"/>
+          </p:nvPr>
+        </p:nvSpPr>
+        <p:spPr/>
+        <p:txBody>
+          <a:bodyPr/>
+          <a:lstStyle/>
+          <a:p>
+            <a:r>
+              <a:rPr kumimoji="1" lang="ja-JP" altLang="en-US" dirty="0" smtClean="0"/>
+              <a:t>ビッグデータとは？</a:t>
+            </a:r>
+            <a:endParaRPr kumimoji="1" lang="en-US" altLang="ja-JP" dirty="0" smtClean="0"/>
+          </a:p>
+          <a:p>
+            <a:pPr lvl="1"/>
+            <a:r>
+              <a:rPr lang="ja-JP" altLang="en-US" dirty="0" smtClean="0"/>
+              <a:t>初期</a:t>
+            </a:r>
+            <a:endParaRPr lang="en-US" altLang="ja-JP" dirty="0" smtClean="0"/>
+          </a:p>
+          <a:p>
+            <a:pPr lvl="2"/>
+            <a:r>
+              <a:rPr kumimoji="1" lang="en-US" altLang="ja-JP" dirty="0" smtClean="0"/>
+              <a:t>SNS </a:t>
+            </a:r>
+            <a:r>
+              <a:rPr lang="ja-JP" altLang="en-US" dirty="0" smtClean="0"/>
+              <a:t>の想定以上のアクセス数に見舞われ、大量に押し寄せるデータを「ビッグデータ」と呼んだ</a:t>
+            </a:r>
+            <a:endParaRPr lang="en-US" altLang="ja-JP" dirty="0" smtClean="0"/>
+          </a:p>
+          <a:p>
+            <a:pPr lvl="1"/>
+            <a:r>
+              <a:rPr kumimoji="1" lang="ja-JP" altLang="en-US" dirty="0" smtClean="0"/>
+              <a:t>例</a:t>
+            </a:r>
+            <a:r>
+              <a:rPr kumimoji="1" lang="en-US" altLang="ja-JP" dirty="0" smtClean="0"/>
+              <a:t>)</a:t>
+            </a:r>
+          </a:p>
+          <a:p>
+            <a:pPr lvl="2"/>
+            <a:r>
+              <a:rPr lang="en-US" altLang="ja-JP" dirty="0" smtClean="0"/>
+              <a:t>Twitter</a:t>
+            </a:r>
+          </a:p>
+          <a:p>
+            <a:pPr lvl="3"/>
+            <a:r>
+              <a:rPr lang="ja-JP" altLang="en-US" dirty="0" smtClean="0"/>
+              <a:t>現在 </a:t>
+            </a:r>
+            <a:r>
+              <a:rPr lang="en-US" altLang="ja-JP" dirty="0" smtClean="0"/>
+              <a:t>1</a:t>
+            </a:r>
+            <a:r>
+              <a:rPr lang="ja-JP" altLang="en-US" dirty="0" smtClean="0"/>
+              <a:t>日あたり </a:t>
+            </a:r>
+            <a:r>
+              <a:rPr lang="en-US" altLang="ja-JP" dirty="0" smtClean="0"/>
+              <a:t>10 </a:t>
+            </a:r>
+            <a:r>
+              <a:rPr lang="ja-JP" altLang="en-US" dirty="0" smtClean="0"/>
+              <a:t>テラバイトを超えるデータ量を扱う</a:t>
+            </a:r>
+            <a:endParaRPr kumimoji="1" lang="ja-JP" altLang="en-US" dirty="0"/>
+          </a:p>
+        </p:txBody>
+      </p:sp>
+    </p:spTree>
+    <p:extLst>
+      <p:ext uri="{BB962C8B-B14F-4D97-AF65-F5344CB8AC3E}">
+        <p14:creationId xmlns:p14="http://schemas.microsoft.com/office/powerpoint/2010/main" val="141187539"/>
+      </p:ext>
+    </p:extLst>
+  </p:cSld>
+  <p:clrMapOvr>
+    <a:masterClrMapping/>
+  </p:clrMapOvr>
+</p:sld>
+</file>
+
+<file path=ppt/slides/slide3.xml><?xml version="1.0" encoding="utf-8"?>
+<p:sld xmlns:a="http://schemas.openxmlformats.org/drawingml/2006/main" xmlns:r="http://schemas.openxmlformats.org/officeDocument/2006/relationships" xmlns:p="http://schemas.openxmlformats.org/presentationml/2006/main">
+  <p:cSld>
+    <p:spTree>
+      <p:nvGrpSpPr>
+        <p:cNvPr id="1" name=""/>
+        <p:cNvGrpSpPr/>
+        <p:nvPr/>
+      </p:nvGrpSpPr>
+      <p:grpSpPr>
+        <a:xfrm>
+          <a:off x="0" y="0"/>
+          <a:ext cx="0" cy="0"/>
+          <a:chOff x="0" y="0"/>
+          <a:chExt cx="0" cy="0"/>
+        </a:xfrm>
+      </p:grpSpPr>
+      <p:sp>
+        <p:nvSpPr>
+          <p:cNvPr id="2" name="タイトル 1"/>
+          <p:cNvSpPr>
+            <a:spLocks noGrp="1"/>
+          </p:cNvSpPr>
+          <p:nvPr>
+            <p:ph type="title"/>
+          </p:nvPr>
+        </p:nvSpPr>
+        <p:spPr/>
+        <p:txBody>
+          <a:bodyPr/>
+          <a:lstStyle/>
+          <a:p>
+            <a:r>
+              <a:rPr kumimoji="1" lang="ja-JP" altLang="en-US" dirty="0" smtClean="0"/>
+              <a:t>ビッグデータの時代</a:t>
+            </a:r>
+            <a:endParaRPr kumimoji="1" lang="ja-JP" altLang="en-US" dirty="0"/>
+          </a:p>
+        </p:txBody>
+      </p:sp>
+      <p:sp>
+        <p:nvSpPr>
+          <p:cNvPr id="3" name="コンテンツ プレースホルダー 2"/>
+          <p:cNvSpPr>
+            <a:spLocks noGrp="1"/>
+          </p:cNvSpPr>
+          <p:nvPr>
+            <p:ph idx="1"/>
+          </p:nvPr>
+        </p:nvSpPr>
+        <p:spPr/>
+        <p:txBody>
+          <a:bodyPr>
+            <a:normAutofit lnSpcReduction="10000"/>
+          </a:bodyPr>
+          <a:lstStyle/>
+          <a:p>
+            <a:r>
+              <a:rPr kumimoji="1" lang="ja-JP" altLang="en-US" dirty="0" smtClean="0"/>
+              <a:t>ビッグデータに対応するための新技術</a:t>
+            </a:r>
+            <a:endParaRPr kumimoji="1" lang="en-US" altLang="ja-JP" dirty="0" smtClean="0"/>
+          </a:p>
+          <a:p>
+            <a:pPr lvl="1"/>
+            <a:r>
+              <a:rPr lang="ja-JP" altLang="en-US" dirty="0" smtClean="0"/>
+              <a:t>従来の </a:t>
+            </a:r>
+            <a:r>
+              <a:rPr lang="en-US" altLang="ja-JP" dirty="0" smtClean="0"/>
+              <a:t>IT </a:t>
+            </a:r>
+            <a:r>
+              <a:rPr lang="ja-JP" altLang="en-US" dirty="0" smtClean="0"/>
+              <a:t>技術にとっては「想定外」</a:t>
+            </a:r>
+            <a:endParaRPr lang="en-US" altLang="ja-JP" dirty="0" smtClean="0"/>
+          </a:p>
+          <a:p>
+            <a:pPr lvl="1"/>
+            <a:r>
+              <a:rPr lang="ja-JP" altLang="en-US" dirty="0" smtClean="0"/>
+              <a:t>ハードウェアの傾向</a:t>
+            </a:r>
+            <a:endParaRPr lang="en-US" altLang="ja-JP" dirty="0" smtClean="0"/>
+          </a:p>
+          <a:p>
+            <a:pPr lvl="2"/>
+            <a:r>
+              <a:rPr kumimoji="1" lang="ja-JP" altLang="en-US" dirty="0" smtClean="0"/>
+              <a:t>大量生産によりサーバ等のコストが年々低減</a:t>
+            </a:r>
+            <a:endParaRPr kumimoji="1" lang="en-US" altLang="ja-JP" dirty="0" smtClean="0"/>
+          </a:p>
+          <a:p>
+            <a:pPr lvl="2"/>
+            <a:r>
+              <a:rPr lang="ja-JP" altLang="en-US" dirty="0" smtClean="0"/>
+              <a:t>ハードディスクの容量、メモリ速度の向上</a:t>
+            </a:r>
+            <a:endParaRPr lang="en-US" altLang="ja-JP" dirty="0"/>
+          </a:p>
+          <a:p>
+            <a:pPr lvl="2"/>
+            <a:endParaRPr lang="en-US" altLang="ja-JP" dirty="0" smtClean="0"/>
+          </a:p>
+          <a:p>
+            <a:r>
+              <a:rPr lang="ja-JP" altLang="en-US" dirty="0" smtClean="0"/>
+              <a:t>サーバを何千台と並べて分散処理</a:t>
+            </a:r>
+            <a:endParaRPr lang="en-US" altLang="ja-JP" dirty="0" smtClean="0"/>
+          </a:p>
+          <a:p>
+            <a:pPr lvl="1"/>
+            <a:r>
+              <a:rPr lang="ja-JP" altLang="en-US" dirty="0" smtClean="0"/>
+              <a:t>例</a:t>
+            </a:r>
+            <a:r>
+              <a:rPr lang="en-US" altLang="ja-JP" dirty="0" smtClean="0"/>
+              <a:t>)</a:t>
+            </a:r>
+          </a:p>
+          <a:p>
+            <a:pPr lvl="2"/>
+            <a:r>
+              <a:rPr lang="en-US" altLang="ja-JP" dirty="0" smtClean="0"/>
+              <a:t>Google </a:t>
+            </a:r>
+            <a:r>
+              <a:rPr lang="en-US" altLang="ja-JP" dirty="0" err="1" smtClean="0"/>
+              <a:t>Bigtable</a:t>
+            </a:r>
+            <a:endParaRPr lang="en-US" altLang="ja-JP" dirty="0" smtClean="0"/>
+          </a:p>
+          <a:p>
+            <a:pPr lvl="2"/>
+            <a:r>
+              <a:rPr lang="en-US" altLang="ja-JP" dirty="0" smtClean="0"/>
+              <a:t>Amazon Dynamo</a:t>
+            </a:r>
+          </a:p>
+        </p:txBody>
+      </p:sp>
+    </p:spTree>
+    <p:extLst>
+      <p:ext uri="{BB962C8B-B14F-4D97-AF65-F5344CB8AC3E}">
+        <p14:creationId xmlns:p14="http://schemas.microsoft.com/office/powerpoint/2010/main" val="755367013"/>
+      </p:ext>
+    </p:extLst>
+  </p:cSld>
+  <p:clrMapOvr>
+    <a:masterClrMapping/>
+  </p:clrMapOvr>
+</p:sld>
+</file>
+
+<file path=ppt/slides/slide4.xml><?xml version="1.0" encoding="utf-8"?>
+<p:sld xmlns:a="http://schemas.openxmlformats.org/drawingml/2006/main" xmlns:r="http://schemas.openxmlformats.org/officeDocument/2006/relationships" xmlns:p="http://schemas.openxmlformats.org/presentationml/2006/main">
+  <p:cSld>
+    <p:spTree>
+      <p:nvGrpSpPr>
+        <p:cNvPr id="1" name=""/>
+        <p:cNvGrpSpPr/>
+        <p:nvPr/>
+      </p:nvGrpSpPr>
+      <p:grpSpPr>
+        <a:xfrm>
+          <a:off x="0" y="0"/>
+          <a:ext cx="0" cy="0"/>
+          <a:chOff x="0" y="0"/>
+          <a:chExt cx="0" cy="0"/>
+        </a:xfrm>
+      </p:grpSpPr>
+      <p:sp>
+        <p:nvSpPr>
+          <p:cNvPr id="2" name="タイトル 1"/>
+          <p:cNvSpPr>
+            <a:spLocks noGrp="1"/>
+          </p:cNvSpPr>
+          <p:nvPr>
+            <p:ph type="title"/>
+          </p:nvPr>
+        </p:nvSpPr>
+        <p:spPr/>
+        <p:txBody>
+          <a:bodyPr/>
+          <a:lstStyle/>
+          <a:p>
+            <a:r>
+              <a:rPr kumimoji="1" lang="ja-JP" altLang="en-US" dirty="0" smtClean="0"/>
+              <a:t>ビッグデータの対応</a:t>
+            </a:r>
+            <a:endParaRPr kumimoji="1" lang="ja-JP" altLang="en-US" dirty="0"/>
+          </a:p>
+        </p:txBody>
+      </p:sp>
+      <p:sp>
+        <p:nvSpPr>
+          <p:cNvPr id="3" name="コンテンツ プレースホルダー 2"/>
+          <p:cNvSpPr>
+            <a:spLocks noGrp="1"/>
+          </p:cNvSpPr>
+          <p:nvPr>
+            <p:ph idx="1"/>
+          </p:nvPr>
+        </p:nvSpPr>
+        <p:spPr/>
+        <p:txBody>
+          <a:bodyPr/>
+          <a:lstStyle/>
+          <a:p>
+            <a:r>
+              <a:rPr kumimoji="1" lang="en-US" altLang="ja-JP" dirty="0" smtClean="0"/>
+              <a:t>3</a:t>
+            </a:r>
+            <a:r>
+              <a:rPr kumimoji="1" lang="ja-JP" altLang="en-US" dirty="0" err="1" smtClean="0"/>
+              <a:t>つの</a:t>
+            </a:r>
+            <a:r>
+              <a:rPr kumimoji="1" lang="en-US" altLang="ja-JP" dirty="0" smtClean="0"/>
+              <a:t>V </a:t>
+            </a:r>
+            <a:r>
+              <a:rPr kumimoji="1" lang="ja-JP" altLang="en-US" dirty="0" smtClean="0"/>
+              <a:t>に対応</a:t>
+            </a:r>
+            <a:endParaRPr kumimoji="1" lang="en-US" altLang="ja-JP" dirty="0" smtClean="0"/>
+          </a:p>
+          <a:p>
+            <a:pPr lvl="1"/>
+            <a:r>
+              <a:rPr lang="en-US" altLang="ja-JP" dirty="0" smtClean="0"/>
+              <a:t>Volume</a:t>
+            </a:r>
+          </a:p>
+          <a:p>
+            <a:pPr lvl="2"/>
+            <a:r>
+              <a:rPr lang="ja-JP" altLang="en-US" dirty="0" smtClean="0"/>
+              <a:t>テラバイト、ペタバイト単位</a:t>
+            </a:r>
+            <a:endParaRPr lang="en-US" altLang="ja-JP" dirty="0" smtClean="0"/>
+          </a:p>
+          <a:p>
+            <a:pPr lvl="1"/>
+            <a:r>
+              <a:rPr kumimoji="1" lang="en-US" altLang="ja-JP" dirty="0" smtClean="0"/>
+              <a:t>Velocity</a:t>
+            </a:r>
+          </a:p>
+          <a:p>
+            <a:pPr lvl="2"/>
+            <a:r>
+              <a:rPr lang="ja-JP" altLang="en-US" dirty="0" smtClean="0"/>
+              <a:t>膨大なデータを分散処理することにより高速化</a:t>
+            </a:r>
+            <a:endParaRPr kumimoji="1" lang="en-US" altLang="ja-JP" dirty="0" smtClean="0"/>
+          </a:p>
+          <a:p>
+            <a:pPr lvl="1"/>
+            <a:r>
+              <a:rPr lang="en-US" altLang="ja-JP" dirty="0" smtClean="0"/>
+              <a:t>Variety</a:t>
+            </a:r>
+          </a:p>
+          <a:p>
+            <a:pPr lvl="2"/>
+            <a:r>
+              <a:rPr kumimoji="1" lang="ja-JP" altLang="en-US"/>
+              <a:t>複雑</a:t>
+            </a:r>
+            <a:r>
+              <a:rPr kumimoji="1" lang="ja-JP" altLang="en-US" smtClean="0"/>
+              <a:t>なデータ構造に柔軟に対応</a:t>
+            </a:r>
+            <a:endParaRPr kumimoji="1" lang="ja-JP" altLang="en-US" dirty="0"/>
+          </a:p>
+        </p:txBody>
+      </p:sp>
+    </p:spTree>
+    <p:extLst>
+      <p:ext uri="{BB962C8B-B14F-4D97-AF65-F5344CB8AC3E}">
+        <p14:creationId xmlns:p14="http://schemas.microsoft.com/office/powerpoint/2010/main" val="644261807"/>
+      </p:ext>
+    </p:extLst>
+  </p:cSld>
+  <p:clrMapOvr>
+    <a:masterClrMapping/>
+  </p:clrMapOvr>
+</p:sld>
+</file>
+
+<file path=ppt/slides/slide5.xml><?xml version="1.0" encoding="utf-8"?>
+<p:sld xmlns:a="http://schemas.openxmlformats.org/drawingml/2006/main" xmlns:r="http://schemas.openxmlformats.org/officeDocument/2006/relationships" xmlns:p="http://schemas.openxmlformats.org/presentationml/2006/main">
+  <p:cSld>
+    <p:spTree>
+      <p:nvGrpSpPr>
+        <p:cNvPr id="1" name=""/>
+        <p:cNvGrpSpPr/>
+        <p:nvPr/>
+      </p:nvGrpSpPr>
+      <p:grpSpPr>
+        <a:xfrm>
+          <a:off x="0" y="0"/>
+          <a:ext cx="0" cy="0"/>
+          <a:chOff x="0" y="0"/>
+          <a:chExt cx="0" cy="0"/>
+        </a:xfrm>
+      </p:grpSpPr>
+      <p:sp>
+        <p:nvSpPr>
+          <p:cNvPr id="2" name="タイトル 1"/>
+          <p:cNvSpPr>
+            <a:spLocks noGrp="1"/>
+          </p:cNvSpPr>
+          <p:nvPr>
+            <p:ph type="title"/>
+          </p:nvPr>
+        </p:nvSpPr>
+        <p:spPr/>
+        <p:txBody>
+          <a:bodyPr/>
+          <a:lstStyle/>
+          <a:p>
+            <a:r>
+              <a:rPr kumimoji="1" lang="en-US" altLang="ja-JP" dirty="0" smtClean="0"/>
+              <a:t>NOSQL</a:t>
+            </a:r>
+            <a:endParaRPr kumimoji="1" lang="ja-JP" altLang="en-US" dirty="0"/>
+          </a:p>
+        </p:txBody>
+      </p:sp>
+      <p:sp>
+        <p:nvSpPr>
+          <p:cNvPr id="3" name="コンテンツ プレースホルダー 2"/>
+          <p:cNvSpPr>
+            <a:spLocks noGrp="1"/>
+          </p:cNvSpPr>
+          <p:nvPr>
+            <p:ph idx="1"/>
+          </p:nvPr>
+        </p:nvSpPr>
+        <p:spPr/>
+        <p:txBody>
+          <a:bodyPr>
+            <a:normAutofit lnSpcReduction="10000"/>
+          </a:bodyPr>
+          <a:lstStyle/>
+          <a:p>
+            <a:r>
+              <a:rPr kumimoji="1" lang="en-US" altLang="ja-JP" dirty="0" smtClean="0"/>
+              <a:t>Not Only SQL</a:t>
+            </a:r>
+          </a:p>
+          <a:p>
+            <a:pPr lvl="1"/>
+            <a:r>
+              <a:rPr lang="ja-JP" altLang="en-US" dirty="0" smtClean="0"/>
+              <a:t>ビッグデータに対して従来の </a:t>
+            </a:r>
+            <a:r>
+              <a:rPr lang="en-US" altLang="ja-JP" dirty="0" smtClean="0"/>
+              <a:t>SQL </a:t>
+            </a:r>
+            <a:r>
+              <a:rPr lang="ja-JP" altLang="en-US" dirty="0" smtClean="0"/>
+              <a:t>を使う </a:t>
+            </a:r>
+            <a:r>
+              <a:rPr lang="en-US" altLang="ja-JP" dirty="0" smtClean="0"/>
+              <a:t>RDB </a:t>
+            </a:r>
+            <a:r>
+              <a:rPr lang="ja-JP" altLang="en-US" dirty="0" err="1" smtClean="0"/>
+              <a:t>だけに</a:t>
+            </a:r>
+            <a:r>
+              <a:rPr lang="ja-JP" altLang="en-US" dirty="0" smtClean="0"/>
+              <a:t>限らない技術を駆使して対応して行こうというムーブメント</a:t>
+            </a:r>
+            <a:endParaRPr lang="en-US" altLang="ja-JP" dirty="0" smtClean="0"/>
+          </a:p>
+          <a:p>
+            <a:r>
+              <a:rPr lang="ja-JP" altLang="en-US" dirty="0"/>
+              <a:t>活</a:t>
+            </a:r>
+            <a:r>
+              <a:rPr lang="ja-JP" altLang="en-US" dirty="0" smtClean="0"/>
+              <a:t>用例</a:t>
+            </a:r>
+            <a:endParaRPr lang="en-US" altLang="ja-JP" dirty="0" smtClean="0"/>
+          </a:p>
+          <a:p>
+            <a:pPr lvl="1"/>
+            <a:r>
+              <a:rPr kumimoji="1" lang="en-US" altLang="ja-JP" dirty="0" smtClean="0"/>
+              <a:t>BBC</a:t>
+            </a:r>
+          </a:p>
+          <a:p>
+            <a:pPr lvl="2"/>
+            <a:r>
+              <a:rPr lang="en-US" altLang="ja-JP" dirty="0" err="1" smtClean="0"/>
+              <a:t>CouchDB</a:t>
+            </a:r>
+            <a:r>
+              <a:rPr lang="en-US" altLang="ja-JP" dirty="0" smtClean="0"/>
+              <a:t> </a:t>
+            </a:r>
+            <a:r>
+              <a:rPr lang="ja-JP" altLang="en-US" dirty="0" smtClean="0"/>
+              <a:t>で２箇所のデータセンターでデータを複製</a:t>
+            </a:r>
+            <a:endParaRPr lang="en-US" altLang="ja-JP" dirty="0" smtClean="0"/>
+          </a:p>
+          <a:p>
+            <a:pPr lvl="1"/>
+            <a:r>
+              <a:rPr kumimoji="1" lang="en-US" altLang="ja-JP" dirty="0" smtClean="0"/>
+              <a:t>New York Times</a:t>
+            </a:r>
+          </a:p>
+          <a:p>
+            <a:pPr lvl="2"/>
+            <a:r>
+              <a:rPr lang="en-US" altLang="ja-JP" dirty="0" smtClean="0"/>
+              <a:t>Cascade </a:t>
+            </a:r>
+            <a:r>
+              <a:rPr lang="ja-JP" altLang="en-US" dirty="0" smtClean="0"/>
+              <a:t>で記事の</a:t>
+            </a:r>
+            <a:r>
+              <a:rPr lang="en-US" altLang="ja-JP" dirty="0" smtClean="0"/>
+              <a:t>RT</a:t>
+            </a:r>
+            <a:r>
+              <a:rPr lang="ja-JP" altLang="en-US" dirty="0" smtClean="0"/>
+              <a:t>数などを集計</a:t>
+            </a:r>
+            <a:endParaRPr lang="en-US" altLang="ja-JP" dirty="0" smtClean="0"/>
+          </a:p>
+          <a:p>
+            <a:pPr lvl="2"/>
+            <a:r>
+              <a:rPr lang="en-US" altLang="ja-JP" dirty="0" err="1" smtClean="0"/>
+              <a:t>MongoDB</a:t>
+            </a:r>
+            <a:r>
+              <a:rPr lang="en-US" altLang="ja-JP" dirty="0" smtClean="0"/>
+              <a:t> </a:t>
+            </a:r>
+            <a:r>
+              <a:rPr lang="ja-JP" altLang="en-US" dirty="0" smtClean="0"/>
+              <a:t>でデータ管理</a:t>
+            </a:r>
+            <a:endParaRPr kumimoji="1" lang="en-US" altLang="ja-JP" dirty="0"/>
+          </a:p>
+        </p:txBody>
+      </p:sp>
+    </p:spTree>
+    <p:extLst>
+      <p:ext uri="{BB962C8B-B14F-4D97-AF65-F5344CB8AC3E}">
+        <p14:creationId xmlns:p14="http://schemas.microsoft.com/office/powerpoint/2010/main" val="682106330"/>
+      </p:ext>
+    </p:extLst>
+  </p:cSld>
+  <p:clrMapOvr>
+    <a:masterClrMapping/>
+  </p:clrMapOvr>
+</p:sld>
+</file>
+
+<file path=ppt/slides/slide6.xml><?xml version="1.0" encoding="utf-8"?>
+<p:sld xmlns:a="http://schemas.openxmlformats.org/drawingml/2006/main" xmlns:r="http://schemas.openxmlformats.org/officeDocument/2006/relationships" xmlns:p="http://schemas.openxmlformats.org/presentationml/2006/main">
+  <p:cSld>
+    <p:spTree>
+      <p:nvGrpSpPr>
+        <p:cNvPr id="1" name=""/>
+        <p:cNvGrpSpPr/>
+        <p:nvPr/>
+      </p:nvGrpSpPr>
+      <p:grpSpPr>
+        <a:xfrm>
+          <a:off x="0" y="0"/>
+          <a:ext cx="0" cy="0"/>
+          <a:chOff x="0" y="0"/>
+          <a:chExt cx="0" cy="0"/>
+        </a:xfrm>
+      </p:grpSpPr>
+      <p:sp>
+        <p:nvSpPr>
+          <p:cNvPr id="2" name="タイトル 1"/>
+          <p:cNvSpPr>
+            <a:spLocks noGrp="1"/>
+          </p:cNvSpPr>
+          <p:nvPr>
+            <p:ph type="title"/>
+          </p:nvPr>
+        </p:nvSpPr>
+        <p:spPr/>
+        <p:txBody>
+          <a:bodyPr/>
+          <a:lstStyle/>
+          <a:p>
+            <a:r>
+              <a:rPr kumimoji="1" lang="en-US" altLang="ja-JP" dirty="0" smtClean="0"/>
+              <a:t>NOSQL </a:t>
+            </a:r>
+            <a:r>
+              <a:rPr kumimoji="1" lang="ja-JP" altLang="en-US" dirty="0" smtClean="0"/>
+              <a:t>データベース</a:t>
+            </a:r>
+            <a:endParaRPr kumimoji="1" lang="ja-JP" altLang="en-US" dirty="0"/>
+          </a:p>
+        </p:txBody>
+      </p:sp>
+      <p:sp>
+        <p:nvSpPr>
+          <p:cNvPr id="3" name="コンテンツ プレースホルダー 2"/>
+          <p:cNvSpPr>
+            <a:spLocks noGrp="1"/>
+          </p:cNvSpPr>
+          <p:nvPr>
+            <p:ph idx="1"/>
+          </p:nvPr>
+        </p:nvSpPr>
+        <p:spPr/>
+        <p:txBody>
+          <a:bodyPr/>
+          <a:lstStyle/>
+          <a:p>
+            <a:r>
+              <a:rPr kumimoji="1" lang="ja-JP" altLang="en-US" dirty="0" smtClean="0"/>
+              <a:t>ビッグデータ対応に最適化された </a:t>
+            </a:r>
+            <a:r>
+              <a:rPr kumimoji="1" lang="en-US" altLang="ja-JP" dirty="0" smtClean="0"/>
+              <a:t>DB</a:t>
+            </a:r>
+          </a:p>
+          <a:p>
+            <a:r>
+              <a:rPr lang="ja-JP" altLang="en-US" dirty="0" smtClean="0"/>
+              <a:t>機能面では </a:t>
+            </a:r>
+            <a:r>
+              <a:rPr lang="en-US" altLang="ja-JP" dirty="0" smtClean="0"/>
+              <a:t>RDB </a:t>
+            </a:r>
+            <a:r>
+              <a:rPr lang="ja-JP" altLang="en-US" dirty="0" smtClean="0"/>
+              <a:t>に劣る</a:t>
+            </a:r>
+            <a:endParaRPr lang="en-US" altLang="ja-JP" dirty="0" smtClean="0"/>
+          </a:p>
+          <a:p>
+            <a:pPr lvl="1"/>
+            <a:r>
+              <a:rPr lang="ja-JP" altLang="en-US" dirty="0"/>
+              <a:t>基本的に</a:t>
+            </a:r>
+            <a:r>
+              <a:rPr lang="ja-JP" altLang="en-US" dirty="0" smtClean="0"/>
+              <a:t>は </a:t>
+            </a:r>
+            <a:r>
+              <a:rPr lang="en-US" altLang="ja-JP" dirty="0" smtClean="0"/>
+              <a:t>Put </a:t>
+            </a:r>
+            <a:r>
+              <a:rPr lang="ja-JP" altLang="en-US" dirty="0" smtClean="0"/>
+              <a:t>と </a:t>
+            </a:r>
+            <a:r>
+              <a:rPr lang="en-US" altLang="ja-JP" dirty="0" smtClean="0"/>
+              <a:t>Get </a:t>
+            </a:r>
+            <a:r>
+              <a:rPr lang="ja-JP" altLang="en-US" dirty="0" smtClean="0"/>
+              <a:t>しかしない</a:t>
+            </a:r>
+            <a:endParaRPr lang="en-US" altLang="ja-JP" dirty="0" smtClean="0"/>
+          </a:p>
+          <a:p>
+            <a:pPr lvl="1"/>
+            <a:r>
+              <a:rPr kumimoji="1" lang="ja-JP" altLang="en-US" dirty="0"/>
+              <a:t>排他</a:t>
+            </a:r>
+            <a:r>
+              <a:rPr kumimoji="1" lang="ja-JP" altLang="en-US" dirty="0" smtClean="0"/>
+              <a:t>制御を提供しない</a:t>
+            </a:r>
+            <a:endParaRPr kumimoji="1" lang="en-US" altLang="ja-JP" dirty="0" smtClean="0"/>
+          </a:p>
+          <a:p>
+            <a:pPr lvl="2"/>
+            <a:r>
+              <a:rPr lang="ja-JP" altLang="en-US" dirty="0" smtClean="0"/>
+              <a:t>データの整合性が緩い</a:t>
+            </a:r>
+            <a:endParaRPr lang="en-US" altLang="ja-JP" dirty="0" smtClean="0"/>
+          </a:p>
+          <a:p>
+            <a:pPr lvl="2"/>
+            <a:r>
+              <a:rPr kumimoji="1" lang="ja-JP" altLang="en-US" dirty="0" smtClean="0"/>
+              <a:t>トレードオフとして大量のデータを高速に処理できる</a:t>
+            </a:r>
+            <a:endParaRPr kumimoji="1" lang="en-US" altLang="ja-JP" dirty="0" smtClean="0"/>
+          </a:p>
+        </p:txBody>
+      </p:sp>
+    </p:spTree>
+    <p:extLst>
+      <p:ext uri="{BB962C8B-B14F-4D97-AF65-F5344CB8AC3E}">
+        <p14:creationId xmlns:p14="http://schemas.microsoft.com/office/powerpoint/2010/main" val="126931555"/>
+      </p:ext>
+    </p:extLst>
+  </p:cSld>
+  <p:clrMapOvr>
+    <a:masterClrMapping/>
+  </p:clrMapOvr>
+</p:sld>
 </file>
 
 <file path=ppt/theme/theme1.xml><?xml version="1.0" encoding="utf-8"?>

</xml_diff>